<commit_message>
attempt to add header 6600
</commit_message>
<xml_diff>
--- a/public/img/headers_square_icons.pptx
+++ b/public/img/headers_square_icons.pptx
@@ -244,7 +244,7 @@
           <a:p>
             <a:fld id="{AB2EBD6C-865C-469B-B79C-DBC19B8D7A2C}" type="datetimeFigureOut">
               <a:rPr lang="en-US" smtClean="0"/>
-              <a:t>2/12/2018</a:t>
+              <a:t>1/14/2020</a:t>
             </a:fld>
             <a:endParaRPr lang="en-US"/>
           </a:p>
@@ -414,7 +414,7 @@
           <a:p>
             <a:fld id="{AB2EBD6C-865C-469B-B79C-DBC19B8D7A2C}" type="datetimeFigureOut">
               <a:rPr lang="en-US" smtClean="0"/>
-              <a:t>2/12/2018</a:t>
+              <a:t>1/14/2020</a:t>
             </a:fld>
             <a:endParaRPr lang="en-US"/>
           </a:p>
@@ -594,7 +594,7 @@
           <a:p>
             <a:fld id="{AB2EBD6C-865C-469B-B79C-DBC19B8D7A2C}" type="datetimeFigureOut">
               <a:rPr lang="en-US" smtClean="0"/>
-              <a:t>2/12/2018</a:t>
+              <a:t>1/14/2020</a:t>
             </a:fld>
             <a:endParaRPr lang="en-US"/>
           </a:p>
@@ -764,7 +764,7 @@
           <a:p>
             <a:fld id="{AB2EBD6C-865C-469B-B79C-DBC19B8D7A2C}" type="datetimeFigureOut">
               <a:rPr lang="en-US" smtClean="0"/>
-              <a:t>2/12/2018</a:t>
+              <a:t>1/14/2020</a:t>
             </a:fld>
             <a:endParaRPr lang="en-US"/>
           </a:p>
@@ -1010,7 +1010,7 @@
           <a:p>
             <a:fld id="{AB2EBD6C-865C-469B-B79C-DBC19B8D7A2C}" type="datetimeFigureOut">
               <a:rPr lang="en-US" smtClean="0"/>
-              <a:t>2/12/2018</a:t>
+              <a:t>1/14/2020</a:t>
             </a:fld>
             <a:endParaRPr lang="en-US"/>
           </a:p>
@@ -1242,7 +1242,7 @@
           <a:p>
             <a:fld id="{AB2EBD6C-865C-469B-B79C-DBC19B8D7A2C}" type="datetimeFigureOut">
               <a:rPr lang="en-US" smtClean="0"/>
-              <a:t>2/12/2018</a:t>
+              <a:t>1/14/2020</a:t>
             </a:fld>
             <a:endParaRPr lang="en-US"/>
           </a:p>
@@ -1609,7 +1609,7 @@
           <a:p>
             <a:fld id="{AB2EBD6C-865C-469B-B79C-DBC19B8D7A2C}" type="datetimeFigureOut">
               <a:rPr lang="en-US" smtClean="0"/>
-              <a:t>2/12/2018</a:t>
+              <a:t>1/14/2020</a:t>
             </a:fld>
             <a:endParaRPr lang="en-US"/>
           </a:p>
@@ -1727,7 +1727,7 @@
           <a:p>
             <a:fld id="{AB2EBD6C-865C-469B-B79C-DBC19B8D7A2C}" type="datetimeFigureOut">
               <a:rPr lang="en-US" smtClean="0"/>
-              <a:t>2/12/2018</a:t>
+              <a:t>1/14/2020</a:t>
             </a:fld>
             <a:endParaRPr lang="en-US"/>
           </a:p>
@@ -1822,7 +1822,7 @@
           <a:p>
             <a:fld id="{AB2EBD6C-865C-469B-B79C-DBC19B8D7A2C}" type="datetimeFigureOut">
               <a:rPr lang="en-US" smtClean="0"/>
-              <a:t>2/12/2018</a:t>
+              <a:t>1/14/2020</a:t>
             </a:fld>
             <a:endParaRPr lang="en-US"/>
           </a:p>
@@ -2099,7 +2099,7 @@
           <a:p>
             <a:fld id="{AB2EBD6C-865C-469B-B79C-DBC19B8D7A2C}" type="datetimeFigureOut">
               <a:rPr lang="en-US" smtClean="0"/>
-              <a:t>2/12/2018</a:t>
+              <a:t>1/14/2020</a:t>
             </a:fld>
             <a:endParaRPr lang="en-US"/>
           </a:p>
@@ -2352,7 +2352,7 @@
           <a:p>
             <a:fld id="{AB2EBD6C-865C-469B-B79C-DBC19B8D7A2C}" type="datetimeFigureOut">
               <a:rPr lang="en-US" smtClean="0"/>
-              <a:t>2/12/2018</a:t>
+              <a:t>1/14/2020</a:t>
             </a:fld>
             <a:endParaRPr lang="en-US"/>
           </a:p>
@@ -2565,7 +2565,7 @@
           <a:p>
             <a:fld id="{AB2EBD6C-865C-469B-B79C-DBC19B8D7A2C}" type="datetimeFigureOut">
               <a:rPr lang="en-US" smtClean="0"/>
-              <a:t>2/12/2018</a:t>
+              <a:t>1/14/2020</a:t>
             </a:fld>
             <a:endParaRPr lang="en-US"/>
           </a:p>
@@ -2978,7 +2978,7 @@
         </p:nvSpPr>
         <p:spPr>
           <a:xfrm>
-            <a:off x="0" y="2306128"/>
+            <a:off x="0" y="2306127"/>
             <a:ext cx="12192000" cy="3053750"/>
           </a:xfrm>
           <a:prstGeom prst="rect">
@@ -3022,7 +3022,7 @@
       </p:sp>
       <p:pic>
         <p:nvPicPr>
-          <p:cNvPr id="2" name="Picture 1"/>
+          <p:cNvPr id="3" name="Picture 2"/>
           <p:cNvPicPr>
             <a:picLocks noChangeAspect="1"/>
           </p:cNvPicPr>
@@ -3042,8 +3042,8 @@
         </p:blipFill>
         <p:spPr>
           <a:xfrm>
-            <a:off x="2633932" y="2568802"/>
-            <a:ext cx="6924136" cy="2614665"/>
+            <a:off x="2805239" y="2515953"/>
+            <a:ext cx="2274105" cy="2634099"/>
           </a:xfrm>
           <a:prstGeom prst="rect">
             <a:avLst/>

</xml_diff>

<commit_message>
create multilevel class page
</commit_message>
<xml_diff>
--- a/public/img/headers_square_icons.pptx
+++ b/public/img/headers_square_icons.pptx
@@ -6,7 +6,8 @@
   </p:sldMasterIdLst>
   <p:sldIdLst>
     <p:sldId id="256" r:id="rId2"/>
-    <p:sldId id="257" r:id="rId3"/>
+    <p:sldId id="258" r:id="rId3"/>
+    <p:sldId id="257" r:id="rId4"/>
   </p:sldIdLst>
   <p:sldSz cx="12192000" cy="6858000"/>
   <p:notesSz cx="6858000" cy="9144000"/>
@@ -244,7 +245,7 @@
           <a:p>
             <a:fld id="{AB2EBD6C-865C-469B-B79C-DBC19B8D7A2C}" type="datetimeFigureOut">
               <a:rPr lang="en-US" smtClean="0"/>
-              <a:t>1/14/2020</a:t>
+              <a:t>9/3/2020</a:t>
             </a:fld>
             <a:endParaRPr lang="en-US"/>
           </a:p>
@@ -414,7 +415,7 @@
           <a:p>
             <a:fld id="{AB2EBD6C-865C-469B-B79C-DBC19B8D7A2C}" type="datetimeFigureOut">
               <a:rPr lang="en-US" smtClean="0"/>
-              <a:t>1/14/2020</a:t>
+              <a:t>9/3/2020</a:t>
             </a:fld>
             <a:endParaRPr lang="en-US"/>
           </a:p>
@@ -594,7 +595,7 @@
           <a:p>
             <a:fld id="{AB2EBD6C-865C-469B-B79C-DBC19B8D7A2C}" type="datetimeFigureOut">
               <a:rPr lang="en-US" smtClean="0"/>
-              <a:t>1/14/2020</a:t>
+              <a:t>9/3/2020</a:t>
             </a:fld>
             <a:endParaRPr lang="en-US"/>
           </a:p>
@@ -764,7 +765,7 @@
           <a:p>
             <a:fld id="{AB2EBD6C-865C-469B-B79C-DBC19B8D7A2C}" type="datetimeFigureOut">
               <a:rPr lang="en-US" smtClean="0"/>
-              <a:t>1/14/2020</a:t>
+              <a:t>9/3/2020</a:t>
             </a:fld>
             <a:endParaRPr lang="en-US"/>
           </a:p>
@@ -1010,7 +1011,7 @@
           <a:p>
             <a:fld id="{AB2EBD6C-865C-469B-B79C-DBC19B8D7A2C}" type="datetimeFigureOut">
               <a:rPr lang="en-US" smtClean="0"/>
-              <a:t>1/14/2020</a:t>
+              <a:t>9/3/2020</a:t>
             </a:fld>
             <a:endParaRPr lang="en-US"/>
           </a:p>
@@ -1242,7 +1243,7 @@
           <a:p>
             <a:fld id="{AB2EBD6C-865C-469B-B79C-DBC19B8D7A2C}" type="datetimeFigureOut">
               <a:rPr lang="en-US" smtClean="0"/>
-              <a:t>1/14/2020</a:t>
+              <a:t>9/3/2020</a:t>
             </a:fld>
             <a:endParaRPr lang="en-US"/>
           </a:p>
@@ -1609,7 +1610,7 @@
           <a:p>
             <a:fld id="{AB2EBD6C-865C-469B-B79C-DBC19B8D7A2C}" type="datetimeFigureOut">
               <a:rPr lang="en-US" smtClean="0"/>
-              <a:t>1/14/2020</a:t>
+              <a:t>9/3/2020</a:t>
             </a:fld>
             <a:endParaRPr lang="en-US"/>
           </a:p>
@@ -1727,7 +1728,7 @@
           <a:p>
             <a:fld id="{AB2EBD6C-865C-469B-B79C-DBC19B8D7A2C}" type="datetimeFigureOut">
               <a:rPr lang="en-US" smtClean="0"/>
-              <a:t>1/14/2020</a:t>
+              <a:t>9/3/2020</a:t>
             </a:fld>
             <a:endParaRPr lang="en-US"/>
           </a:p>
@@ -1822,7 +1823,7 @@
           <a:p>
             <a:fld id="{AB2EBD6C-865C-469B-B79C-DBC19B8D7A2C}" type="datetimeFigureOut">
               <a:rPr lang="en-US" smtClean="0"/>
-              <a:t>1/14/2020</a:t>
+              <a:t>9/3/2020</a:t>
             </a:fld>
             <a:endParaRPr lang="en-US"/>
           </a:p>
@@ -2099,7 +2100,7 @@
           <a:p>
             <a:fld id="{AB2EBD6C-865C-469B-B79C-DBC19B8D7A2C}" type="datetimeFigureOut">
               <a:rPr lang="en-US" smtClean="0"/>
-              <a:t>1/14/2020</a:t>
+              <a:t>9/3/2020</a:t>
             </a:fld>
             <a:endParaRPr lang="en-US"/>
           </a:p>
@@ -2352,7 +2353,7 @@
           <a:p>
             <a:fld id="{AB2EBD6C-865C-469B-B79C-DBC19B8D7A2C}" type="datetimeFigureOut">
               <a:rPr lang="en-US" smtClean="0"/>
-              <a:t>1/14/2020</a:t>
+              <a:t>9/3/2020</a:t>
             </a:fld>
             <a:endParaRPr lang="en-US"/>
           </a:p>
@@ -2565,7 +2566,7 @@
           <a:p>
             <a:fld id="{AB2EBD6C-865C-469B-B79C-DBC19B8D7A2C}" type="datetimeFigureOut">
               <a:rPr lang="en-US" smtClean="0"/>
-              <a:t>1/14/2020</a:t>
+              <a:t>9/3/2020</a:t>
             </a:fld>
             <a:endParaRPr lang="en-US"/>
           </a:p>
@@ -3022,6 +3023,116 @@
       </p:sp>
       <p:pic>
         <p:nvPicPr>
+          <p:cNvPr id="2" name="Picture 1"/>
+          <p:cNvPicPr>
+            <a:picLocks noChangeAspect="1"/>
+          </p:cNvPicPr>
+          <p:nvPr/>
+        </p:nvPicPr>
+        <p:blipFill>
+          <a:blip r:embed="rId2">
+            <a:extLst>
+              <a:ext uri="{28A0092B-C50C-407E-A947-70E740481C1C}">
+                <a14:useLocalDpi xmlns:a14="http://schemas.microsoft.com/office/drawing/2010/main" val="0"/>
+              </a:ext>
+            </a:extLst>
+          </a:blip>
+          <a:stretch>
+            <a:fillRect/>
+          </a:stretch>
+        </p:blipFill>
+        <p:spPr>
+          <a:xfrm>
+            <a:off x="2805780" y="2526001"/>
+            <a:ext cx="2273564" cy="2633472"/>
+          </a:xfrm>
+          <a:prstGeom prst="rect">
+            <a:avLst/>
+          </a:prstGeom>
+        </p:spPr>
+      </p:pic>
+    </p:spTree>
+    <p:extLst>
+      <p:ext uri="{BB962C8B-B14F-4D97-AF65-F5344CB8AC3E}">
+        <p14:creationId xmlns:p14="http://schemas.microsoft.com/office/powerpoint/2010/main" val="3907059513"/>
+      </p:ext>
+    </p:extLst>
+  </p:cSld>
+  <p:clrMapOvr>
+    <a:masterClrMapping/>
+  </p:clrMapOvr>
+</p:sld>
+</file>
+
+<file path=ppt/slides/slide2.xml><?xml version="1.0" encoding="utf-8"?>
+<p:sld xmlns:a="http://schemas.openxmlformats.org/drawingml/2006/main" xmlns:r="http://schemas.openxmlformats.org/officeDocument/2006/relationships" xmlns:p="http://schemas.openxmlformats.org/presentationml/2006/main">
+  <p:cSld>
+    <p:spTree>
+      <p:nvGrpSpPr>
+        <p:cNvPr id="1" name=""/>
+        <p:cNvGrpSpPr/>
+        <p:nvPr/>
+      </p:nvGrpSpPr>
+      <p:grpSpPr>
+        <a:xfrm>
+          <a:off x="0" y="0"/>
+          <a:ext cx="0" cy="0"/>
+          <a:chOff x="0" y="0"/>
+          <a:chExt cx="0" cy="0"/>
+        </a:xfrm>
+      </p:grpSpPr>
+      <p:sp>
+        <p:nvSpPr>
+          <p:cNvPr id="6" name="Rectangle 5"/>
+          <p:cNvSpPr/>
+          <p:nvPr/>
+        </p:nvSpPr>
+        <p:spPr>
+          <a:xfrm>
+            <a:off x="0" y="2306127"/>
+            <a:ext cx="12192000" cy="3053750"/>
+          </a:xfrm>
+          <a:prstGeom prst="rect">
+            <a:avLst/>
+          </a:prstGeom>
+          <a:solidFill>
+            <a:schemeClr val="bg1">
+              <a:lumMod val="85000"/>
+            </a:schemeClr>
+          </a:solidFill>
+          <a:ln>
+            <a:solidFill>
+              <a:schemeClr val="tx1"/>
+            </a:solidFill>
+          </a:ln>
+        </p:spPr>
+        <p:style>
+          <a:lnRef idx="2">
+            <a:schemeClr val="accent1">
+              <a:shade val="50000"/>
+            </a:schemeClr>
+          </a:lnRef>
+          <a:fillRef idx="1">
+            <a:schemeClr val="accent1"/>
+          </a:fillRef>
+          <a:effectRef idx="0">
+            <a:schemeClr val="accent1"/>
+          </a:effectRef>
+          <a:fontRef idx="minor">
+            <a:schemeClr val="lt1"/>
+          </a:fontRef>
+        </p:style>
+        <p:txBody>
+          <a:bodyPr rtlCol="0" anchor="ctr"/>
+          <a:lstStyle/>
+          <a:p>
+            <a:pPr algn="ctr"/>
+            <a:endParaRPr lang="en-US"/>
+          </a:p>
+        </p:txBody>
+      </p:sp>
+      <p:pic>
+        <p:nvPicPr>
           <p:cNvPr id="3" name="Picture 2"/>
           <p:cNvPicPr>
             <a:picLocks noChangeAspect="1"/>
@@ -3053,7 +3164,7 @@
     </p:spTree>
     <p:extLst>
       <p:ext uri="{BB962C8B-B14F-4D97-AF65-F5344CB8AC3E}">
-        <p14:creationId xmlns:p14="http://schemas.microsoft.com/office/powerpoint/2010/main" val="3907059513"/>
+        <p14:creationId xmlns:p14="http://schemas.microsoft.com/office/powerpoint/2010/main" val="1906438460"/>
       </p:ext>
     </p:extLst>
   </p:cSld>
@@ -3063,7 +3174,7 @@
 </p:sld>
 </file>
 
-<file path=ppt/slides/slide2.xml><?xml version="1.0" encoding="utf-8"?>
+<file path=ppt/slides/slide3.xml><?xml version="1.0" encoding="utf-8"?>
 <p:sld xmlns:a="http://schemas.openxmlformats.org/drawingml/2006/main" xmlns:r="http://schemas.openxmlformats.org/officeDocument/2006/relationships" xmlns:p="http://schemas.openxmlformats.org/presentationml/2006/main">
   <p:cSld>
     <p:spTree>

</xml_diff>